<commit_message>
Added for initial version
</commit_message>
<xml_diff>
--- a/assignments/week2&3_assignment.pptx
+++ b/assignments/week2&3_assignment.pptx
@@ -4410,7 +4410,7 @@
           <a:p>
             <a:r>
               <a:rPr lang="en-US" dirty="0"/>
-              <a:t>Bar Chart</a:t>
+              <a:t>Line Chart</a:t>
             </a:r>
           </a:p>
           <a:p>
@@ -4441,7 +4441,7 @@
           <a:p>
             <a:r>
               <a:rPr lang="en-US" dirty="0"/>
-              <a:t>Stacked Bar Chart</a:t>
+              <a:t>Step Chart</a:t>
             </a:r>
           </a:p>
           <a:p>
@@ -4451,10 +4451,10 @@
       </p:sp>
       <p:pic>
         <p:nvPicPr>
-          <p:cNvPr id="6" name="Picture 5">
-            <a:extLst>
-              <a:ext uri="{FF2B5EF4-FFF2-40B4-BE49-F238E27FC236}">
-                <a16:creationId xmlns:a16="http://schemas.microsoft.com/office/drawing/2014/main" id="{1179DB8C-E6C9-430A-BB8A-5F5017130338}"/>
+          <p:cNvPr id="8" name="Picture 7">
+            <a:extLst>
+              <a:ext uri="{FF2B5EF4-FFF2-40B4-BE49-F238E27FC236}">
+                <a16:creationId xmlns:a16="http://schemas.microsoft.com/office/drawing/2014/main" id="{01438966-4FE2-4E65-A0F9-02214B3F697C}"/>
               </a:ext>
             </a:extLst>
           </p:cNvPr>
@@ -4471,8 +4471,8 @@
         </p:blipFill>
         <p:spPr>
           <a:xfrm>
-            <a:off x="372264" y="2281382"/>
-            <a:ext cx="4753918" cy="3550031"/>
+            <a:off x="1131993" y="2278764"/>
+            <a:ext cx="3994189" cy="3969635"/>
           </a:xfrm>
           <a:prstGeom prst="rect">
             <a:avLst/>
@@ -4481,10 +4481,10 @@
       </p:pic>
       <p:pic>
         <p:nvPicPr>
-          <p:cNvPr id="7" name="Picture 6">
-            <a:extLst>
-              <a:ext uri="{FF2B5EF4-FFF2-40B4-BE49-F238E27FC236}">
-                <a16:creationId xmlns:a16="http://schemas.microsoft.com/office/drawing/2014/main" id="{BB4F4737-D143-431F-B1EA-1AAD1079359A}"/>
+          <p:cNvPr id="10" name="Picture 9">
+            <a:extLst>
+              <a:ext uri="{FF2B5EF4-FFF2-40B4-BE49-F238E27FC236}">
+                <a16:creationId xmlns:a16="http://schemas.microsoft.com/office/drawing/2014/main" id="{5D5FBBED-BBBE-42DF-A653-580314476B6A}"/>
               </a:ext>
             </a:extLst>
           </p:cNvPr>
@@ -4501,8 +4501,8 @@
         </p:blipFill>
         <p:spPr>
           <a:xfrm>
-            <a:off x="5446222" y="2531533"/>
-            <a:ext cx="4891788" cy="2758593"/>
+            <a:off x="5956180" y="2278763"/>
+            <a:ext cx="4508619" cy="3969635"/>
           </a:xfrm>
           <a:prstGeom prst="rect">
             <a:avLst/>

</xml_diff>

<commit_message>
Added after week 4
</commit_message>
<xml_diff>
--- a/assignments/week2&3_assignment.pptx
+++ b/assignments/week2&3_assignment.pptx
@@ -301,7 +301,7 @@
           <a:p>
             <a:fld id="{91F9259A-1FE3-4FF9-8A07-BDD8177164ED}" type="datetime4">
               <a:rPr lang="en-US" smtClean="0"/>
-              <a:t>September 18, 2021</a:t>
+              <a:t>September 24, 2021</a:t>
             </a:fld>
             <a:endParaRPr lang="en-US"/>
           </a:p>
@@ -476,7 +476,7 @@
           <a:p>
             <a:fld id="{E5CC3C8F-D4A7-4EAD-92AD-82C91CB8BB85}" type="datetime4">
               <a:rPr lang="en-US" smtClean="0"/>
-              <a:t>September 18, 2021</a:t>
+              <a:t>September 24, 2021</a:t>
             </a:fld>
             <a:endParaRPr lang="en-US"/>
           </a:p>
@@ -713,7 +713,7 @@
           <a:p>
             <a:fld id="{BC011D41-E33C-4BC7-8272-37E8417FD097}" type="datetime4">
               <a:rPr lang="en-US" smtClean="0"/>
-              <a:t>September 18, 2021</a:t>
+              <a:t>September 24, 2021</a:t>
             </a:fld>
             <a:endParaRPr lang="en-US"/>
           </a:p>
@@ -918,7 +918,7 @@
           <a:p>
             <a:fld id="{5D340FED-6E95-4177-A7EF-CD303B9E611D}" type="datetime4">
               <a:rPr lang="en-US" smtClean="0"/>
-              <a:t>September 18, 2021</a:t>
+              <a:t>September 24, 2021</a:t>
             </a:fld>
             <a:endParaRPr lang="en-US"/>
           </a:p>
@@ -1208,7 +1208,7 @@
           <a:p>
             <a:fld id="{477962CB-39AD-45A9-800F-54DAB53D6021}" type="datetime4">
               <a:rPr lang="en-US" smtClean="0"/>
-              <a:t>September 18, 2021</a:t>
+              <a:t>September 24, 2021</a:t>
             </a:fld>
             <a:endParaRPr lang="en-US"/>
           </a:p>
@@ -1492,7 +1492,7 @@
           <a:p>
             <a:fld id="{2DEDF93D-55AB-4606-B9D7-742F1FC51983}" type="datetime4">
               <a:rPr lang="en-US" smtClean="0"/>
-              <a:t>September 18, 2021</a:t>
+              <a:t>September 24, 2021</a:t>
             </a:fld>
             <a:endParaRPr lang="en-US" dirty="0"/>
           </a:p>
@@ -1909,7 +1909,7 @@
           <a:p>
             <a:fld id="{DDF2841D-FB5C-47AB-B2FF-32E855C1EA71}" type="datetime4">
               <a:rPr lang="en-US" smtClean="0"/>
-              <a:t>September 18, 2021</a:t>
+              <a:t>September 24, 2021</a:t>
             </a:fld>
             <a:endParaRPr lang="en-US"/>
           </a:p>
@@ -2050,7 +2050,7 @@
           <a:p>
             <a:fld id="{118537E9-D174-424D-BEE8-AFC4CA5F9F97}" type="datetime4">
               <a:rPr lang="en-US" smtClean="0"/>
-              <a:t>September 18, 2021</a:t>
+              <a:t>September 24, 2021</a:t>
             </a:fld>
             <a:endParaRPr lang="en-US"/>
           </a:p>
@@ -2191,7 +2191,7 @@
           <a:p>
             <a:fld id="{1C7A44C0-F7AC-49C2-8289-1E7A86D9FB50}" type="datetime4">
               <a:rPr lang="en-US" smtClean="0"/>
-              <a:t>September 18, 2021</a:t>
+              <a:t>September 24, 2021</a:t>
             </a:fld>
             <a:endParaRPr lang="en-US"/>
           </a:p>
@@ -2506,7 +2506,7 @@
           <a:p>
             <a:fld id="{73BB84BC-6E78-40D1-8831-40AB1F596614}" type="datetime4">
               <a:rPr lang="en-US" smtClean="0"/>
-              <a:t>September 18, 2021</a:t>
+              <a:t>September 24, 2021</a:t>
             </a:fld>
             <a:endParaRPr lang="en-US"/>
           </a:p>
@@ -2799,7 +2799,7 @@
           <a:p>
             <a:fld id="{ADFA080F-3961-4D42-BEDE-84A1FED032F1}" type="datetime4">
               <a:rPr lang="en-US" smtClean="0"/>
-              <a:t>September 18, 2021</a:t>
+              <a:t>September 24, 2021</a:t>
             </a:fld>
             <a:endParaRPr lang="en-US"/>
           </a:p>
@@ -3081,7 +3081,7 @@
             <a:fld id="{A33960BD-7AC1-4217-9611-AAA56D3EE38F}" type="datetime4">
               <a:rPr lang="en-US" smtClean="0"/>
               <a:pPr/>
-              <a:t>September 18, 2021</a:t>
+              <a:t>September 24, 2021</a:t>
             </a:fld>
             <a:endParaRPr lang="en-US" dirty="0">
               <a:latin typeface="+mn-lt"/>
@@ -4749,10 +4749,10 @@
       </p:sp>
       <p:pic>
         <p:nvPicPr>
-          <p:cNvPr id="6" name="Content Placeholder 5">
-            <a:extLst>
-              <a:ext uri="{FF2B5EF4-FFF2-40B4-BE49-F238E27FC236}">
-                <a16:creationId xmlns:a16="http://schemas.microsoft.com/office/drawing/2014/main" id="{0DB32837-A2BE-4782-AC84-D6CB655E635C}"/>
+          <p:cNvPr id="7" name="Content Placeholder 6">
+            <a:extLst>
+              <a:ext uri="{FF2B5EF4-FFF2-40B4-BE49-F238E27FC236}">
+                <a16:creationId xmlns:a16="http://schemas.microsoft.com/office/drawing/2014/main" id="{06CD8FB5-C662-4E48-AD6F-2394C4D24ED4}"/>
               </a:ext>
             </a:extLst>
           </p:cNvPr>
@@ -4771,8 +4771,8 @@
         </p:blipFill>
         <p:spPr>
           <a:xfrm>
-            <a:off x="1496292" y="1825625"/>
-            <a:ext cx="8035636" cy="4460875"/>
+            <a:off x="1713633" y="1825625"/>
+            <a:ext cx="8047183" cy="4460875"/>
           </a:xfrm>
         </p:spPr>
       </p:pic>

</xml_diff>